<commit_message>
Made the sidebar appear on the bottom on smaller screens.
</commit_message>
<xml_diff>
--- a/Docs/ER.pptx
+++ b/Docs/ER.pptx
@@ -2650,7 +2650,7 @@
         <a:spcBef>
           <a:spcPts val="1000"/>
         </a:spcBef>
-        <a:buFont typeface="Arial" panose="02080604020202020204" pitchFamily="34" charset="0"/>
+        <a:buFont typeface="Arial" panose="020B0604020202020204" pitchFamily="34" charset="0"/>
         <a:buChar char="•"/>
         <a:defRPr sz="2800" kern="1200">
           <a:solidFill>
@@ -2668,7 +2668,7 @@
         <a:spcBef>
           <a:spcPts val="500"/>
         </a:spcBef>
-        <a:buFont typeface="Arial" panose="02080604020202020204" pitchFamily="34" charset="0"/>
+        <a:buFont typeface="Arial" panose="020B0604020202020204" pitchFamily="34" charset="0"/>
         <a:buChar char="•"/>
         <a:defRPr sz="2400" kern="1200">
           <a:solidFill>
@@ -2686,7 +2686,7 @@
         <a:spcBef>
           <a:spcPts val="500"/>
         </a:spcBef>
-        <a:buFont typeface="Arial" panose="02080604020202020204" pitchFamily="34" charset="0"/>
+        <a:buFont typeface="Arial" panose="020B0604020202020204" pitchFamily="34" charset="0"/>
         <a:buChar char="•"/>
         <a:defRPr sz="2000" kern="1200">
           <a:solidFill>
@@ -2704,7 +2704,7 @@
         <a:spcBef>
           <a:spcPts val="500"/>
         </a:spcBef>
-        <a:buFont typeface="Arial" panose="02080604020202020204" pitchFamily="34" charset="0"/>
+        <a:buFont typeface="Arial" panose="020B0604020202020204" pitchFamily="34" charset="0"/>
         <a:buChar char="•"/>
         <a:defRPr sz="1800" kern="1200">
           <a:solidFill>
@@ -2722,7 +2722,7 @@
         <a:spcBef>
           <a:spcPts val="500"/>
         </a:spcBef>
-        <a:buFont typeface="Arial" panose="02080604020202020204" pitchFamily="34" charset="0"/>
+        <a:buFont typeface="Arial" panose="020B0604020202020204" pitchFamily="34" charset="0"/>
         <a:buChar char="•"/>
         <a:defRPr sz="1800" kern="1200">
           <a:solidFill>
@@ -2740,7 +2740,7 @@
         <a:spcBef>
           <a:spcPts val="500"/>
         </a:spcBef>
-        <a:buFont typeface="Arial" panose="02080604020202020204" pitchFamily="34" charset="0"/>
+        <a:buFont typeface="Arial" panose="020B0604020202020204" pitchFamily="34" charset="0"/>
         <a:buChar char="•"/>
         <a:defRPr sz="1800" kern="1200">
           <a:solidFill>
@@ -2758,7 +2758,7 @@
         <a:spcBef>
           <a:spcPts val="500"/>
         </a:spcBef>
-        <a:buFont typeface="Arial" panose="02080604020202020204" pitchFamily="34" charset="0"/>
+        <a:buFont typeface="Arial" panose="020B0604020202020204" pitchFamily="34" charset="0"/>
         <a:buChar char="•"/>
         <a:defRPr sz="1800" kern="1200">
           <a:solidFill>
@@ -2776,7 +2776,7 @@
         <a:spcBef>
           <a:spcPts val="500"/>
         </a:spcBef>
-        <a:buFont typeface="Arial" panose="02080604020202020204" pitchFamily="34" charset="0"/>
+        <a:buFont typeface="Arial" panose="020B0604020202020204" pitchFamily="34" charset="0"/>
         <a:buChar char="•"/>
         <a:defRPr sz="1800" kern="1200">
           <a:solidFill>
@@ -2794,7 +2794,7 @@
         <a:spcBef>
           <a:spcPts val="500"/>
         </a:spcBef>
-        <a:buFont typeface="Arial" panose="02080604020202020204" pitchFamily="34" charset="0"/>
+        <a:buFont typeface="Arial" panose="020B0604020202020204" pitchFamily="34" charset="0"/>
         <a:buChar char="•"/>
         <a:defRPr sz="1800" kern="1200">
           <a:solidFill>
@@ -4673,7 +4673,7 @@
             <a:pPr algn="ctr"/>
             <a:r>
               <a:rPr lang="en-IN" altLang="en-US" sz="1600"/>
-              <a:t>Tech</a:t>
+              <a:t>Projects</a:t>
             </a:r>
             <a:endParaRPr lang="en-IN" altLang="en-US" sz="1600"/>
           </a:p>

</xml_diff>